<commit_message>
clarify the step of getting standardized aspects and units from Semantic Arts
</commit_message>
<xml_diff>
--- a/migration/v13.0/uomDataConversion.pptx
+++ b/migration/v13.0/uomDataConversion.pptx
@@ -221,7 +221,7 @@
           <a:p>
             <a:fld id="{C1A201FB-52D0-024E-8BE4-45BE9A2AD3D5}" type="datetimeFigureOut">
               <a:rPr lang="en-US" smtClean="0"/>
-              <a:t>5/31/24</a:t>
+              <a:t>6/10/24</a:t>
             </a:fld>
             <a:endParaRPr lang="en-US"/>
           </a:p>
@@ -635,7 +635,7 @@
           <a:p>
             <a:fld id="{E25ED99D-99D4-D748-92F6-927E57E8D692}" type="datetime1">
               <a:rPr lang="en-US" smtClean="0"/>
-              <a:t>5/31/24</a:t>
+              <a:t>6/10/24</a:t>
             </a:fld>
             <a:endParaRPr lang="en-US"/>
           </a:p>
@@ -833,7 +833,7 @@
           <a:p>
             <a:fld id="{1704F7E9-2852-AB4C-995F-D7D0DE02FB16}" type="datetime1">
               <a:rPr lang="en-US" smtClean="0"/>
-              <a:t>5/31/24</a:t>
+              <a:t>6/10/24</a:t>
             </a:fld>
             <a:endParaRPr lang="en-US"/>
           </a:p>
@@ -1041,7 +1041,7 @@
           <a:p>
             <a:fld id="{0BAEB659-747D-8043-BA2B-9F85B08A4B1D}" type="datetime1">
               <a:rPr lang="en-US" smtClean="0"/>
-              <a:t>5/31/24</a:t>
+              <a:t>6/10/24</a:t>
             </a:fld>
             <a:endParaRPr lang="en-US"/>
           </a:p>
@@ -1239,7 +1239,7 @@
           <a:p>
             <a:fld id="{EF4F5B6B-B7B9-E94D-9D54-3C11CF650FC4}" type="datetime1">
               <a:rPr lang="en-US" smtClean="0"/>
-              <a:t>5/31/24</a:t>
+              <a:t>6/10/24</a:t>
             </a:fld>
             <a:endParaRPr lang="en-US"/>
           </a:p>
@@ -1514,7 +1514,7 @@
           <a:p>
             <a:fld id="{FF0FB32D-7207-5148-884F-CB1DFE764950}" type="datetime1">
               <a:rPr lang="en-US" smtClean="0"/>
-              <a:t>5/31/24</a:t>
+              <a:t>6/10/24</a:t>
             </a:fld>
             <a:endParaRPr lang="en-US"/>
           </a:p>
@@ -1779,7 +1779,7 @@
           <a:p>
             <a:fld id="{E8843282-B054-0F4C-8D6E-AA0AF4DF916B}" type="datetime1">
               <a:rPr lang="en-US" smtClean="0"/>
-              <a:t>5/31/24</a:t>
+              <a:t>6/10/24</a:t>
             </a:fld>
             <a:endParaRPr lang="en-US"/>
           </a:p>
@@ -2191,7 +2191,7 @@
           <a:p>
             <a:fld id="{494A79EE-B487-9547-8048-D585D76BE425}" type="datetime1">
               <a:rPr lang="en-US" smtClean="0"/>
-              <a:t>5/31/24</a:t>
+              <a:t>6/10/24</a:t>
             </a:fld>
             <a:endParaRPr lang="en-US"/>
           </a:p>
@@ -2332,7 +2332,7 @@
           <a:p>
             <a:fld id="{029DBEF3-7560-3543-8E4C-72F1437A00D9}" type="datetime1">
               <a:rPr lang="en-US" smtClean="0"/>
-              <a:t>5/31/24</a:t>
+              <a:t>6/10/24</a:t>
             </a:fld>
             <a:endParaRPr lang="en-US"/>
           </a:p>
@@ -2445,7 +2445,7 @@
           <a:p>
             <a:fld id="{F8D3AAA1-BC04-8A4D-9F2D-8543AEAD588A}" type="datetime1">
               <a:rPr lang="en-US" smtClean="0"/>
-              <a:t>5/31/24</a:t>
+              <a:t>6/10/24</a:t>
             </a:fld>
             <a:endParaRPr lang="en-US"/>
           </a:p>
@@ -2756,7 +2756,7 @@
           <a:p>
             <a:fld id="{7BD9324C-937D-3B44-9A79-1B4FD0156DCB}" type="datetime1">
               <a:rPr lang="en-US" smtClean="0"/>
-              <a:t>5/31/24</a:t>
+              <a:t>6/10/24</a:t>
             </a:fld>
             <a:endParaRPr lang="en-US"/>
           </a:p>
@@ -3044,7 +3044,7 @@
           <a:p>
             <a:fld id="{7337DC6C-0BB0-E141-BAE8-EC9DD4AF6042}" type="datetime1">
               <a:rPr lang="en-US" smtClean="0"/>
-              <a:t>5/31/24</a:t>
+              <a:t>6/10/24</a:t>
             </a:fld>
             <a:endParaRPr lang="en-US"/>
           </a:p>
@@ -3285,7 +3285,7 @@
           <a:p>
             <a:fld id="{F83122BE-0A57-464E-9A56-AB34174B0EAE}" type="datetime1">
               <a:rPr lang="en-US" smtClean="0"/>
-              <a:t>5/31/24</a:t>
+              <a:t>6/10/24</a:t>
             </a:fld>
             <a:endParaRPr lang="en-US"/>
           </a:p>
@@ -6380,8 +6380,8 @@
         </p:nvSpPr>
         <p:spPr>
           <a:xfrm>
-            <a:off x="3605842" y="3401245"/>
-            <a:ext cx="8419381" cy="646331"/>
+            <a:off x="4389135" y="3389298"/>
+            <a:ext cx="6051725" cy="646331"/>
           </a:xfrm>
           <a:prstGeom prst="rect">
             <a:avLst/>
@@ -6400,20 +6400,15 @@
           <a:lstStyle/>
           <a:p>
             <a:r>
-              <a:rPr lang="en-US" dirty="0"/>
-              <a:t>Have client Aspects and Units added to the SA reference data as needed (no duplicates).</a:t>
-            </a:r>
-          </a:p>
-          <a:p>
-            <a:r>
-              <a:rPr lang="en-US" dirty="0"/>
-              <a:t>Then validate the entire set of reference data using </a:t>
-            </a:r>
-            <a:r>
-              <a:rPr lang="en-US" dirty="0" err="1"/>
-              <a:t>validateReferenceData.rq</a:t>
-            </a:r>
-            <a:endParaRPr lang="en-US" dirty="0"/>
+              <a:rPr lang="en-US" sz="1800" dirty="0"/>
+              <a:t>provide Semantic Arts with a list of existing aspects and units</a:t>
+            </a:r>
+          </a:p>
+          <a:p>
+            <a:r>
+              <a:rPr lang="en-US" sz="1800" dirty="0"/>
+              <a:t>Semantic Arts will return a list of standard aspects and units</a:t>
+            </a:r>
           </a:p>
         </p:txBody>
       </p:sp>
@@ -6496,7 +6491,7 @@
             <a:pPr algn="ctr"/>
             <a:r>
               <a:rPr lang="en-US" dirty="0"/>
-              <a:t>Update Semantic Arts reference data</a:t>
+              <a:t>Get Semantic Arts reference data</a:t>
             </a:r>
           </a:p>
         </p:txBody>
@@ -13472,7 +13467,7 @@
         <p:spPr>
           <a:xfrm>
             <a:off x="5593947" y="2475640"/>
-            <a:ext cx="2256323" cy="523220"/>
+            <a:ext cx="4629024" cy="523220"/>
           </a:xfrm>
           <a:prstGeom prst="rect">
             <a:avLst/>
@@ -13486,17 +13481,15 @@
           <a:lstStyle/>
           <a:p>
             <a:r>
-              <a:rPr lang="en-US" sz="1400" dirty="0" err="1"/>
-              <a:t>validateReferenceData</a:t>
-            </a:r>
-            <a:endParaRPr lang="en-US" sz="1400" dirty="0"/>
-          </a:p>
-          <a:p>
-            <a:r>
-              <a:rPr lang="en-US" sz="1400" dirty="0" err="1"/>
-              <a:t>prepareClientReferenceData</a:t>
-            </a:r>
-            <a:endParaRPr lang="en-US" sz="1400" dirty="0"/>
+              <a:rPr lang="en-US" sz="1400" dirty="0"/>
+              <a:t>provide Semantic Arts with a list of existing aspects and units</a:t>
+            </a:r>
+          </a:p>
+          <a:p>
+            <a:r>
+              <a:rPr lang="en-US" sz="1400" dirty="0"/>
+              <a:t>Semantic Arts will return a list of standard aspects and units</a:t>
+            </a:r>
           </a:p>
         </p:txBody>
       </p:sp>
@@ -13658,7 +13651,7 @@
             <a:pPr algn="ctr"/>
             <a:r>
               <a:rPr lang="en-US" dirty="0"/>
-              <a:t>Update Semantic Arts reference data</a:t>
+              <a:t>Get Semantic Arts reference data</a:t>
             </a:r>
           </a:p>
         </p:txBody>

</xml_diff>

<commit_message>
removed redundant text in diagram
</commit_message>
<xml_diff>
--- a/migration/v13.0/uomDataConversion.pptx
+++ b/migration/v13.0/uomDataConversion.pptx
@@ -15650,58 +15650,6 @@
           </p:txBody>
         </p:sp>
       </p:grpSp>
-      <p:sp>
-        <p:nvSpPr>
-          <p:cNvPr id="60" name="TextBox 59">
-            <a:extLst>
-              <a:ext uri="{FF2B5EF4-FFF2-40B4-BE49-F238E27FC236}">
-                <a16:creationId xmlns:a16="http://schemas.microsoft.com/office/drawing/2014/main" id="{39C6D353-8EC0-5578-A573-EE68E3732A86}"/>
-              </a:ext>
-            </a:extLst>
-          </p:cNvPr>
-          <p:cNvSpPr txBox="1"/>
-          <p:nvPr/>
-        </p:nvSpPr>
-        <p:spPr>
-          <a:xfrm>
-            <a:off x="621792" y="953726"/>
-            <a:ext cx="2956259" cy="830997"/>
-          </a:xfrm>
-          <a:prstGeom prst="rect">
-            <a:avLst/>
-          </a:prstGeom>
-          <a:solidFill>
-            <a:schemeClr val="accent6">
-              <a:lumMod val="20000"/>
-              <a:lumOff val="80000"/>
-            </a:schemeClr>
-          </a:solidFill>
-        </p:spPr>
-        <p:txBody>
-          <a:bodyPr wrap="none" rtlCol="0">
-            <a:spAutoFit/>
-          </a:bodyPr>
-          <a:lstStyle/>
-          <a:p>
-            <a:r>
-              <a:rPr lang="en-US" sz="1600" dirty="0"/>
-              <a:t>Aspect represented as a class</a:t>
-            </a:r>
-          </a:p>
-          <a:p>
-            <a:r>
-              <a:rPr lang="en-US" sz="1600" dirty="0"/>
-              <a:t>Aspect represented as a category</a:t>
-            </a:r>
-          </a:p>
-          <a:p>
-            <a:r>
-              <a:rPr lang="en-US" sz="1600" dirty="0"/>
-              <a:t>Aspect represented as a property</a:t>
-            </a:r>
-          </a:p>
-        </p:txBody>
-      </p:sp>
       <p:sp>
         <p:nvSpPr>
           <p:cNvPr id="6" name="Rectangle 5">

</xml_diff>

<commit_message>
added note to clarify meaning of the word client in the slide deck
</commit_message>
<xml_diff>
--- a/migration/v13.0/uomDataConversion.pptx
+++ b/migration/v13.0/uomDataConversion.pptx
@@ -220,7 +220,7 @@
           <a:p>
             <a:fld id="{C1A201FB-52D0-024E-8BE4-45BE9A2AD3D5}" type="datetimeFigureOut">
               <a:rPr lang="en-US" smtClean="0"/>
-              <a:t>6/19/24</a:t>
+              <a:t>6/24/24</a:t>
             </a:fld>
             <a:endParaRPr lang="en-US"/>
           </a:p>
@@ -634,7 +634,7 @@
           <a:p>
             <a:fld id="{E25ED99D-99D4-D748-92F6-927E57E8D692}" type="datetime1">
               <a:rPr lang="en-US" smtClean="0"/>
-              <a:t>6/19/24</a:t>
+              <a:t>6/24/24</a:t>
             </a:fld>
             <a:endParaRPr lang="en-US"/>
           </a:p>
@@ -832,7 +832,7 @@
           <a:p>
             <a:fld id="{1704F7E9-2852-AB4C-995F-D7D0DE02FB16}" type="datetime1">
               <a:rPr lang="en-US" smtClean="0"/>
-              <a:t>6/19/24</a:t>
+              <a:t>6/24/24</a:t>
             </a:fld>
             <a:endParaRPr lang="en-US"/>
           </a:p>
@@ -1040,7 +1040,7 @@
           <a:p>
             <a:fld id="{0BAEB659-747D-8043-BA2B-9F85B08A4B1D}" type="datetime1">
               <a:rPr lang="en-US" smtClean="0"/>
-              <a:t>6/19/24</a:t>
+              <a:t>6/24/24</a:t>
             </a:fld>
             <a:endParaRPr lang="en-US"/>
           </a:p>
@@ -1238,7 +1238,7 @@
           <a:p>
             <a:fld id="{EF4F5B6B-B7B9-E94D-9D54-3C11CF650FC4}" type="datetime1">
               <a:rPr lang="en-US" smtClean="0"/>
-              <a:t>6/19/24</a:t>
+              <a:t>6/24/24</a:t>
             </a:fld>
             <a:endParaRPr lang="en-US"/>
           </a:p>
@@ -1513,7 +1513,7 @@
           <a:p>
             <a:fld id="{FF0FB32D-7207-5148-884F-CB1DFE764950}" type="datetime1">
               <a:rPr lang="en-US" smtClean="0"/>
-              <a:t>6/19/24</a:t>
+              <a:t>6/24/24</a:t>
             </a:fld>
             <a:endParaRPr lang="en-US"/>
           </a:p>
@@ -1778,7 +1778,7 @@
           <a:p>
             <a:fld id="{E8843282-B054-0F4C-8D6E-AA0AF4DF916B}" type="datetime1">
               <a:rPr lang="en-US" smtClean="0"/>
-              <a:t>6/19/24</a:t>
+              <a:t>6/24/24</a:t>
             </a:fld>
             <a:endParaRPr lang="en-US"/>
           </a:p>
@@ -2190,7 +2190,7 @@
           <a:p>
             <a:fld id="{494A79EE-B487-9547-8048-D585D76BE425}" type="datetime1">
               <a:rPr lang="en-US" smtClean="0"/>
-              <a:t>6/19/24</a:t>
+              <a:t>6/24/24</a:t>
             </a:fld>
             <a:endParaRPr lang="en-US"/>
           </a:p>
@@ -2331,7 +2331,7 @@
           <a:p>
             <a:fld id="{029DBEF3-7560-3543-8E4C-72F1437A00D9}" type="datetime1">
               <a:rPr lang="en-US" smtClean="0"/>
-              <a:t>6/19/24</a:t>
+              <a:t>6/24/24</a:t>
             </a:fld>
             <a:endParaRPr lang="en-US"/>
           </a:p>
@@ -2444,7 +2444,7 @@
           <a:p>
             <a:fld id="{F8D3AAA1-BC04-8A4D-9F2D-8543AEAD588A}" type="datetime1">
               <a:rPr lang="en-US" smtClean="0"/>
-              <a:t>6/19/24</a:t>
+              <a:t>6/24/24</a:t>
             </a:fld>
             <a:endParaRPr lang="en-US"/>
           </a:p>
@@ -2755,7 +2755,7 @@
           <a:p>
             <a:fld id="{7BD9324C-937D-3B44-9A79-1B4FD0156DCB}" type="datetime1">
               <a:rPr lang="en-US" smtClean="0"/>
-              <a:t>6/19/24</a:t>
+              <a:t>6/24/24</a:t>
             </a:fld>
             <a:endParaRPr lang="en-US"/>
           </a:p>
@@ -3043,7 +3043,7 @@
           <a:p>
             <a:fld id="{7337DC6C-0BB0-E141-BAE8-EC9DD4AF6042}" type="datetime1">
               <a:rPr lang="en-US" smtClean="0"/>
-              <a:t>6/19/24</a:t>
+              <a:t>6/24/24</a:t>
             </a:fld>
             <a:endParaRPr lang="en-US"/>
           </a:p>
@@ -3284,7 +3284,7 @@
           <a:p>
             <a:fld id="{F83122BE-0A57-464E-9A56-AB34174B0EAE}" type="datetime1">
               <a:rPr lang="en-US" smtClean="0"/>
-              <a:t>6/19/24</a:t>
+              <a:t>6/24/24</a:t>
             </a:fld>
             <a:endParaRPr lang="en-US"/>
           </a:p>
@@ -13057,6 +13057,46 @@
             <a:r>
               <a:rPr lang="en-US" dirty="0"/>
               <a:t>Note: this deck shows the “all-in” approach to data conversion. It can be customized as needed.</a:t>
+            </a:r>
+          </a:p>
+        </p:txBody>
+      </p:sp>
+      <p:sp>
+        <p:nvSpPr>
+          <p:cNvPr id="3" name="TextBox 2">
+            <a:extLst>
+              <a:ext uri="{FF2B5EF4-FFF2-40B4-BE49-F238E27FC236}">
+                <a16:creationId xmlns:a16="http://schemas.microsoft.com/office/drawing/2014/main" id="{DBB96D94-69E5-F277-E616-6D7F96161932}"/>
+              </a:ext>
+            </a:extLst>
+          </p:cNvPr>
+          <p:cNvSpPr txBox="1"/>
+          <p:nvPr/>
+        </p:nvSpPr>
+        <p:spPr>
+          <a:xfrm>
+            <a:off x="1736970" y="4904632"/>
+            <a:ext cx="7019486" cy="369332"/>
+          </a:xfrm>
+          <a:prstGeom prst="rect">
+            <a:avLst/>
+          </a:prstGeom>
+          <a:solidFill>
+            <a:schemeClr val="accent6">
+              <a:lumMod val="20000"/>
+              <a:lumOff val="80000"/>
+            </a:schemeClr>
+          </a:solidFill>
+        </p:spPr>
+        <p:txBody>
+          <a:bodyPr wrap="none" rtlCol="0">
+            <a:spAutoFit/>
+          </a:bodyPr>
+          <a:lstStyle/>
+          <a:p>
+            <a:r>
+              <a:rPr lang="en-US" dirty="0"/>
+              <a:t>Note: the term “client” in this slide deck refers to an Enterprise using gist.</a:t>
             </a:r>
           </a:p>
         </p:txBody>

</xml_diff>

<commit_message>
clarify meaning of term client in uom migration powerpoint
</commit_message>
<xml_diff>
--- a/migration/v13.0/uomDataConversion.pptx
+++ b/migration/v13.0/uomDataConversion.pptx
@@ -220,7 +220,7 @@
           <a:p>
             <a:fld id="{C1A201FB-52D0-024E-8BE4-45BE9A2AD3D5}" type="datetimeFigureOut">
               <a:rPr lang="en-US" smtClean="0"/>
-              <a:t>6/19/24</a:t>
+              <a:t>7/15/24</a:t>
             </a:fld>
             <a:endParaRPr lang="en-US"/>
           </a:p>
@@ -634,7 +634,7 @@
           <a:p>
             <a:fld id="{E25ED99D-99D4-D748-92F6-927E57E8D692}" type="datetime1">
               <a:rPr lang="en-US" smtClean="0"/>
-              <a:t>6/19/24</a:t>
+              <a:t>7/15/24</a:t>
             </a:fld>
             <a:endParaRPr lang="en-US"/>
           </a:p>
@@ -832,7 +832,7 @@
           <a:p>
             <a:fld id="{1704F7E9-2852-AB4C-995F-D7D0DE02FB16}" type="datetime1">
               <a:rPr lang="en-US" smtClean="0"/>
-              <a:t>6/19/24</a:t>
+              <a:t>7/15/24</a:t>
             </a:fld>
             <a:endParaRPr lang="en-US"/>
           </a:p>
@@ -1040,7 +1040,7 @@
           <a:p>
             <a:fld id="{0BAEB659-747D-8043-BA2B-9F85B08A4B1D}" type="datetime1">
               <a:rPr lang="en-US" smtClean="0"/>
-              <a:t>6/19/24</a:t>
+              <a:t>7/15/24</a:t>
             </a:fld>
             <a:endParaRPr lang="en-US"/>
           </a:p>
@@ -1238,7 +1238,7 @@
           <a:p>
             <a:fld id="{EF4F5B6B-B7B9-E94D-9D54-3C11CF650FC4}" type="datetime1">
               <a:rPr lang="en-US" smtClean="0"/>
-              <a:t>6/19/24</a:t>
+              <a:t>7/15/24</a:t>
             </a:fld>
             <a:endParaRPr lang="en-US"/>
           </a:p>
@@ -1513,7 +1513,7 @@
           <a:p>
             <a:fld id="{FF0FB32D-7207-5148-884F-CB1DFE764950}" type="datetime1">
               <a:rPr lang="en-US" smtClean="0"/>
-              <a:t>6/19/24</a:t>
+              <a:t>7/15/24</a:t>
             </a:fld>
             <a:endParaRPr lang="en-US"/>
           </a:p>
@@ -1778,7 +1778,7 @@
           <a:p>
             <a:fld id="{E8843282-B054-0F4C-8D6E-AA0AF4DF916B}" type="datetime1">
               <a:rPr lang="en-US" smtClean="0"/>
-              <a:t>6/19/24</a:t>
+              <a:t>7/15/24</a:t>
             </a:fld>
             <a:endParaRPr lang="en-US"/>
           </a:p>
@@ -2190,7 +2190,7 @@
           <a:p>
             <a:fld id="{494A79EE-B487-9547-8048-D585D76BE425}" type="datetime1">
               <a:rPr lang="en-US" smtClean="0"/>
-              <a:t>6/19/24</a:t>
+              <a:t>7/15/24</a:t>
             </a:fld>
             <a:endParaRPr lang="en-US"/>
           </a:p>
@@ -2331,7 +2331,7 @@
           <a:p>
             <a:fld id="{029DBEF3-7560-3543-8E4C-72F1437A00D9}" type="datetime1">
               <a:rPr lang="en-US" smtClean="0"/>
-              <a:t>6/19/24</a:t>
+              <a:t>7/15/24</a:t>
             </a:fld>
             <a:endParaRPr lang="en-US"/>
           </a:p>
@@ -2444,7 +2444,7 @@
           <a:p>
             <a:fld id="{F8D3AAA1-BC04-8A4D-9F2D-8543AEAD588A}" type="datetime1">
               <a:rPr lang="en-US" smtClean="0"/>
-              <a:t>6/19/24</a:t>
+              <a:t>7/15/24</a:t>
             </a:fld>
             <a:endParaRPr lang="en-US"/>
           </a:p>
@@ -2755,7 +2755,7 @@
           <a:p>
             <a:fld id="{7BD9324C-937D-3B44-9A79-1B4FD0156DCB}" type="datetime1">
               <a:rPr lang="en-US" smtClean="0"/>
-              <a:t>6/19/24</a:t>
+              <a:t>7/15/24</a:t>
             </a:fld>
             <a:endParaRPr lang="en-US"/>
           </a:p>
@@ -3043,7 +3043,7 @@
           <a:p>
             <a:fld id="{7337DC6C-0BB0-E141-BAE8-EC9DD4AF6042}" type="datetime1">
               <a:rPr lang="en-US" smtClean="0"/>
-              <a:t>6/19/24</a:t>
+              <a:t>7/15/24</a:t>
             </a:fld>
             <a:endParaRPr lang="en-US"/>
           </a:p>
@@ -3284,7 +3284,7 @@
           <a:p>
             <a:fld id="{F83122BE-0A57-464E-9A56-AB34174B0EAE}" type="datetime1">
               <a:rPr lang="en-US" smtClean="0"/>
-              <a:t>6/19/24</a:t>
+              <a:t>7/15/24</a:t>
             </a:fld>
             <a:endParaRPr lang="en-US"/>
           </a:p>
@@ -13057,6 +13057,46 @@
             <a:r>
               <a:rPr lang="en-US" dirty="0"/>
               <a:t>Note: this deck shows the “all-in” approach to data conversion. It can be customized as needed.</a:t>
+            </a:r>
+          </a:p>
+        </p:txBody>
+      </p:sp>
+      <p:sp>
+        <p:nvSpPr>
+          <p:cNvPr id="3" name="TextBox 2">
+            <a:extLst>
+              <a:ext uri="{FF2B5EF4-FFF2-40B4-BE49-F238E27FC236}">
+                <a16:creationId xmlns:a16="http://schemas.microsoft.com/office/drawing/2014/main" id="{1818FCC7-7D66-E7A5-F6CA-5D9136E2978E}"/>
+              </a:ext>
+            </a:extLst>
+          </p:cNvPr>
+          <p:cNvSpPr txBox="1"/>
+          <p:nvPr/>
+        </p:nvSpPr>
+        <p:spPr>
+          <a:xfrm>
+            <a:off x="1736970" y="4791247"/>
+            <a:ext cx="7037119" cy="369332"/>
+          </a:xfrm>
+          <a:prstGeom prst="rect">
+            <a:avLst/>
+          </a:prstGeom>
+          <a:solidFill>
+            <a:schemeClr val="accent6">
+              <a:lumMod val="20000"/>
+              <a:lumOff val="80000"/>
+            </a:schemeClr>
+          </a:solidFill>
+        </p:spPr>
+        <p:txBody>
+          <a:bodyPr wrap="none" rtlCol="0">
+            <a:spAutoFit/>
+          </a:bodyPr>
+          <a:lstStyle/>
+          <a:p>
+            <a:r>
+              <a:rPr lang="en-US" dirty="0"/>
+              <a:t>Note: the term “client” in this deck refers to any Enterprise that uses gist.</a:t>
             </a:r>
           </a:p>
         </p:txBody>

</xml_diff>

<commit_message>
Changed date on cover slide
</commit_message>
<xml_diff>
--- a/migration/v13.0/uomDataConversion.pptx
+++ b/migration/v13.0/uomDataConversion.pptx
@@ -220,7 +220,7 @@
           <a:p>
             <a:fld id="{C1A201FB-52D0-024E-8BE4-45BE9A2AD3D5}" type="datetimeFigureOut">
               <a:rPr lang="en-US" smtClean="0"/>
-              <a:t>7/15/24</a:t>
+              <a:t>7/23/24</a:t>
             </a:fld>
             <a:endParaRPr lang="en-US"/>
           </a:p>
@@ -634,7 +634,7 @@
           <a:p>
             <a:fld id="{E25ED99D-99D4-D748-92F6-927E57E8D692}" type="datetime1">
               <a:rPr lang="en-US" smtClean="0"/>
-              <a:t>7/15/24</a:t>
+              <a:t>7/23/24</a:t>
             </a:fld>
             <a:endParaRPr lang="en-US"/>
           </a:p>
@@ -832,7 +832,7 @@
           <a:p>
             <a:fld id="{1704F7E9-2852-AB4C-995F-D7D0DE02FB16}" type="datetime1">
               <a:rPr lang="en-US" smtClean="0"/>
-              <a:t>7/15/24</a:t>
+              <a:t>7/23/24</a:t>
             </a:fld>
             <a:endParaRPr lang="en-US"/>
           </a:p>
@@ -1040,7 +1040,7 @@
           <a:p>
             <a:fld id="{0BAEB659-747D-8043-BA2B-9F85B08A4B1D}" type="datetime1">
               <a:rPr lang="en-US" smtClean="0"/>
-              <a:t>7/15/24</a:t>
+              <a:t>7/23/24</a:t>
             </a:fld>
             <a:endParaRPr lang="en-US"/>
           </a:p>
@@ -1238,7 +1238,7 @@
           <a:p>
             <a:fld id="{EF4F5B6B-B7B9-E94D-9D54-3C11CF650FC4}" type="datetime1">
               <a:rPr lang="en-US" smtClean="0"/>
-              <a:t>7/15/24</a:t>
+              <a:t>7/23/24</a:t>
             </a:fld>
             <a:endParaRPr lang="en-US"/>
           </a:p>
@@ -1513,7 +1513,7 @@
           <a:p>
             <a:fld id="{FF0FB32D-7207-5148-884F-CB1DFE764950}" type="datetime1">
               <a:rPr lang="en-US" smtClean="0"/>
-              <a:t>7/15/24</a:t>
+              <a:t>7/23/24</a:t>
             </a:fld>
             <a:endParaRPr lang="en-US"/>
           </a:p>
@@ -1778,7 +1778,7 @@
           <a:p>
             <a:fld id="{E8843282-B054-0F4C-8D6E-AA0AF4DF916B}" type="datetime1">
               <a:rPr lang="en-US" smtClean="0"/>
-              <a:t>7/15/24</a:t>
+              <a:t>7/23/24</a:t>
             </a:fld>
             <a:endParaRPr lang="en-US"/>
           </a:p>
@@ -2190,7 +2190,7 @@
           <a:p>
             <a:fld id="{494A79EE-B487-9547-8048-D585D76BE425}" type="datetime1">
               <a:rPr lang="en-US" smtClean="0"/>
-              <a:t>7/15/24</a:t>
+              <a:t>7/23/24</a:t>
             </a:fld>
             <a:endParaRPr lang="en-US"/>
           </a:p>
@@ -2331,7 +2331,7 @@
           <a:p>
             <a:fld id="{029DBEF3-7560-3543-8E4C-72F1437A00D9}" type="datetime1">
               <a:rPr lang="en-US" smtClean="0"/>
-              <a:t>7/15/24</a:t>
+              <a:t>7/23/24</a:t>
             </a:fld>
             <a:endParaRPr lang="en-US"/>
           </a:p>
@@ -2444,7 +2444,7 @@
           <a:p>
             <a:fld id="{F8D3AAA1-BC04-8A4D-9F2D-8543AEAD588A}" type="datetime1">
               <a:rPr lang="en-US" smtClean="0"/>
-              <a:t>7/15/24</a:t>
+              <a:t>7/23/24</a:t>
             </a:fld>
             <a:endParaRPr lang="en-US"/>
           </a:p>
@@ -2755,7 +2755,7 @@
           <a:p>
             <a:fld id="{7BD9324C-937D-3B44-9A79-1B4FD0156DCB}" type="datetime1">
               <a:rPr lang="en-US" smtClean="0"/>
-              <a:t>7/15/24</a:t>
+              <a:t>7/23/24</a:t>
             </a:fld>
             <a:endParaRPr lang="en-US"/>
           </a:p>
@@ -3043,7 +3043,7 @@
           <a:p>
             <a:fld id="{7337DC6C-0BB0-E141-BAE8-EC9DD4AF6042}" type="datetime1">
               <a:rPr lang="en-US" smtClean="0"/>
-              <a:t>7/15/24</a:t>
+              <a:t>7/23/24</a:t>
             </a:fld>
             <a:endParaRPr lang="en-US"/>
           </a:p>
@@ -3284,7 +3284,7 @@
           <a:p>
             <a:fld id="{F83122BE-0A57-464E-9A56-AB34174B0EAE}" type="datetime1">
               <a:rPr lang="en-US" smtClean="0"/>
-              <a:t>7/15/24</a:t>
+              <a:t>7/23/24</a:t>
             </a:fld>
             <a:endParaRPr lang="en-US"/>
           </a:p>
@@ -3803,8 +3803,12 @@
           <a:p>
             <a:pPr algn="ctr"/>
             <a:r>
+              <a:rPr lang="en-US" sz="2000"/>
+              <a:t>July </a:t>
+            </a:r>
+            <a:r>
               <a:rPr lang="en-US" sz="2000" dirty="0"/>
-              <a:t>June 2024</a:t>
+              <a:t>2024</a:t>
             </a:r>
           </a:p>
         </p:txBody>

</xml_diff>